<commit_message>
added TR photos to .ppt
</commit_message>
<xml_diff>
--- a/Project3_Group2.pptx
+++ b/Project3_Group2.pptx
@@ -105,6 +105,11 @@
       </a:defRPr>
     </a:lvl9pPr>
   </p:defaultTextStyle>
+  <p:extLst>
+    <p:ext uri="{EFAFB233-063F-42B5-8137-9DF3F51BA10A}">
+      <p15:sldGuideLst xmlns:p15="http://schemas.microsoft.com/office/powerpoint/2012/main"/>
+    </p:ext>
+  </p:extLst>
 </p:presentation>
 </file>
 
@@ -293,7 +298,7 @@
           <a:p>
             <a:fld id="{88D38747-4367-4BD2-8D51-C97E202738E2}" type="datetime1">
               <a:rPr lang="en-US" smtClean="0"/>
-              <a:t>2/25/2021</a:t>
+              <a:t>2/26/2021</a:t>
             </a:fld>
             <a:endParaRPr lang="en-US" dirty="0"/>
           </a:p>
@@ -598,7 +603,7 @@
           <a:p>
             <a:fld id="{11F1B079-7EF0-44EE-B798-BCC497C9F3B2}" type="datetime1">
               <a:rPr lang="en-US" smtClean="0"/>
-              <a:t>2/25/2021</a:t>
+              <a:t>2/26/2021</a:t>
             </a:fld>
             <a:endParaRPr lang="en-US" dirty="0"/>
           </a:p>
@@ -792,7 +797,7 @@
           <a:p>
             <a:fld id="{28FF70A8-1D13-4657-95F0-A9EA54967B8D}" type="datetime1">
               <a:rPr lang="en-US" smtClean="0"/>
-              <a:t>2/25/2021</a:t>
+              <a:t>2/26/2021</a:t>
             </a:fld>
             <a:endParaRPr lang="en-US" dirty="0"/>
           </a:p>
@@ -1055,7 +1060,7 @@
           <a:p>
             <a:fld id="{21EB90AC-71BD-4C7F-8ACA-7B3F18292E63}" type="datetime1">
               <a:rPr lang="en-US" smtClean="0"/>
-              <a:t>2/25/2021</a:t>
+              <a:t>2/26/2021</a:t>
             </a:fld>
             <a:endParaRPr lang="en-US" dirty="0"/>
           </a:p>
@@ -1491,7 +1496,7 @@
           <a:p>
             <a:fld id="{4E6EFC2C-8905-46F0-B443-CE905B76BA01}" type="datetime1">
               <a:rPr lang="en-US" smtClean="0"/>
-              <a:t>2/25/2021</a:t>
+              <a:t>2/26/2021</a:t>
             </a:fld>
             <a:endParaRPr lang="en-US" dirty="0"/>
           </a:p>
@@ -2028,7 +2033,7 @@
           <a:p>
             <a:fld id="{D9079DC3-C9B5-499E-9140-0DC28B7074E2}" type="datetime1">
               <a:rPr lang="en-US" smtClean="0"/>
-              <a:t>2/25/2021</a:t>
+              <a:t>2/26/2021</a:t>
             </a:fld>
             <a:endParaRPr lang="en-US" dirty="0"/>
           </a:p>
@@ -2910,7 +2915,7 @@
           <a:p>
             <a:fld id="{30BB33EA-E472-4D22-9C03-A9C14AA21CED}" type="datetime1">
               <a:rPr lang="en-US" smtClean="0"/>
-              <a:t>2/25/2021</a:t>
+              <a:t>2/26/2021</a:t>
             </a:fld>
             <a:endParaRPr lang="en-US" dirty="0"/>
           </a:p>
@@ -3080,7 +3085,7 @@
           <a:p>
             <a:fld id="{217E833E-1B6D-415F-AD29-75AE8C43BD0D}" type="datetime1">
               <a:rPr lang="en-US" smtClean="0"/>
-              <a:t>2/25/2021</a:t>
+              <a:t>2/26/2021</a:t>
             </a:fld>
             <a:endParaRPr lang="en-US" dirty="0"/>
           </a:p>
@@ -3264,7 +3269,7 @@
           <a:p>
             <a:fld id="{8452596F-08A7-4B70-989A-F2B1CF31E66B}" type="datetime1">
               <a:rPr lang="en-US" smtClean="0"/>
-              <a:t>2/25/2021</a:t>
+              <a:t>2/26/2021</a:t>
             </a:fld>
             <a:endParaRPr lang="en-US" dirty="0"/>
           </a:p>
@@ -3434,7 +3439,7 @@
           <a:p>
             <a:fld id="{73C55A3C-5767-4844-A0A3-83778C2E5409}" type="datetime1">
               <a:rPr lang="en-US" smtClean="0"/>
-              <a:t>2/25/2021</a:t>
+              <a:t>2/26/2021</a:t>
             </a:fld>
             <a:endParaRPr lang="en-US" dirty="0"/>
           </a:p>
@@ -3678,7 +3683,7 @@
           <a:p>
             <a:fld id="{CAE507A8-A5CF-4D38-AB86-7EDDA87A85D4}" type="datetime1">
               <a:rPr lang="en-US" smtClean="0"/>
-              <a:t>2/25/2021</a:t>
+              <a:t>2/26/2021</a:t>
             </a:fld>
             <a:endParaRPr lang="en-US" dirty="0"/>
           </a:p>
@@ -3920,7 +3925,7 @@
           <a:p>
             <a:fld id="{BDFCD27C-8599-43EF-BA1D-14DDC1946E06}" type="datetime1">
               <a:rPr lang="en-US" smtClean="0"/>
-              <a:t>2/25/2021</a:t>
+              <a:t>2/26/2021</a:t>
             </a:fld>
             <a:endParaRPr lang="en-US" dirty="0"/>
           </a:p>
@@ -4401,7 +4406,7 @@
           <a:p>
             <a:fld id="{49343D99-809A-49C0-96E5-4250D0B498EE}" type="datetime1">
               <a:rPr lang="en-US" smtClean="0"/>
-              <a:t>2/25/2021</a:t>
+              <a:t>2/26/2021</a:t>
             </a:fld>
             <a:endParaRPr lang="en-US" dirty="0"/>
           </a:p>
@@ -4519,7 +4524,7 @@
           <a:p>
             <a:fld id="{A143DE9B-B678-4EFB-BB7D-A4370204A0B0}" type="datetime1">
               <a:rPr lang="en-US" smtClean="0"/>
-              <a:t>2/25/2021</a:t>
+              <a:t>2/26/2021</a:t>
             </a:fld>
             <a:endParaRPr lang="en-US" dirty="0"/>
           </a:p>
@@ -4614,7 +4619,7 @@
           <a:p>
             <a:fld id="{E68812DA-F765-4142-A6A3-A8ED7235E082}" type="datetime1">
               <a:rPr lang="en-US" smtClean="0"/>
-              <a:t>2/25/2021</a:t>
+              <a:t>2/26/2021</a:t>
             </a:fld>
             <a:endParaRPr lang="en-US" dirty="0"/>
           </a:p>
@@ -4869,7 +4874,7 @@
           <a:p>
             <a:fld id="{3E0277FD-7DE6-41D4-930D-AC99F5AFE54E}" type="datetime1">
               <a:rPr lang="en-US" smtClean="0"/>
-              <a:t>2/25/2021</a:t>
+              <a:t>2/26/2021</a:t>
             </a:fld>
             <a:endParaRPr lang="en-US" dirty="0"/>
           </a:p>
@@ -5176,7 +5181,7 @@
           <a:p>
             <a:fld id="{9EA15526-7079-4B7B-987C-1B5FAE11A0FF}" type="datetime1">
               <a:rPr lang="en-US" smtClean="0"/>
-              <a:t>2/25/2021</a:t>
+              <a:t>2/26/2021</a:t>
             </a:fld>
             <a:endParaRPr lang="en-US" dirty="0"/>
           </a:p>
@@ -5411,7 +5416,7 @@
           <a:p>
             <a:fld id="{073ED0CC-082F-4160-86E5-0D6041F12778}" type="datetime1">
               <a:rPr lang="en-US" smtClean="0"/>
-              <a:t>2/25/2021</a:t>
+              <a:t>2/26/2021</a:t>
             </a:fld>
             <a:endParaRPr lang="en-US" dirty="0"/>
           </a:p>
@@ -6198,7 +6203,7 @@
           </a:effectLst>
           <a:extLst>
             <a:ext uri="{91240B29-F687-4f45-9708-019B960494DF}">
-              <a14:hiddenLine xmlns="" xmlns:a16="http://schemas.microsoft.com/office/drawing/2014/main" xmlns:p14="http://schemas.microsoft.com/office/powerpoint/2010/main" xmlns:a14="http://schemas.microsoft.com/office/drawing/2010/main" w="9525">
+              <a14:hiddenLine xmlns:a14="http://schemas.microsoft.com/office/drawing/2010/main" xmlns:p14="http://schemas.microsoft.com/office/powerpoint/2010/main" xmlns:a16="http://schemas.microsoft.com/office/drawing/2014/main" xmlns="" w="9525">
                 <a:solidFill>
                   <a:srgbClr val="000000"/>
                 </a:solidFill>
@@ -6340,10 +6345,10 @@
       </p:grpSpPr>
       <p:sp>
         <p:nvSpPr>
-          <p:cNvPr id="2" name="Title 1">
+          <p:cNvPr id="4" name="Title 3">
             <a:extLst>
               <a:ext uri="{FF2B5EF4-FFF2-40B4-BE49-F238E27FC236}">
-                <a16:creationId xmlns:a16="http://schemas.microsoft.com/office/drawing/2014/main" id="{C14CF39B-4042-4FEB-84C6-24F377B63791}"/>
+                <a16:creationId xmlns:a16="http://schemas.microsoft.com/office/drawing/2014/main" id="{43D2B3F9-E647-4C4C-8A37-1053BE78B433}"/>
               </a:ext>
             </a:extLst>
           </p:cNvPr>
@@ -6354,37 +6359,133 @@
             <p:ph type="title"/>
           </p:nvPr>
         </p:nvSpPr>
-        <p:spPr/>
+        <p:spPr>
+          <a:xfrm>
+            <a:off x="919119" y="331305"/>
+            <a:ext cx="10353762" cy="970450"/>
+          </a:xfrm>
+        </p:spPr>
         <p:txBody>
           <a:bodyPr/>
           <a:lstStyle/>
           <a:p>
-            <a:endParaRPr lang="en-US" dirty="0"/>
-          </a:p>
-        </p:txBody>
-      </p:sp>
-      <p:sp>
-        <p:nvSpPr>
-          <p:cNvPr id="3" name="Content Placeholder 2">
+            <a:r>
+              <a:rPr lang="en-US" dirty="0"/>
+              <a:t>Using K-Means to Create Art</a:t>
+            </a:r>
+          </a:p>
+        </p:txBody>
+      </p:sp>
+      <p:pic>
+        <p:nvPicPr>
+          <p:cNvPr id="10" name="Content Placeholder 9" descr="A person smiling for the picture&#10;&#10;Description automatically generated with low confidence">
             <a:extLst>
               <a:ext uri="{FF2B5EF4-FFF2-40B4-BE49-F238E27FC236}">
-                <a16:creationId xmlns:a16="http://schemas.microsoft.com/office/drawing/2014/main" id="{64B9E848-EE6B-427C-B4DD-58CE82CCFF9F}"/>
+                <a16:creationId xmlns:a16="http://schemas.microsoft.com/office/drawing/2014/main" id="{281F5282-69E5-4A2E-B648-F7C326340A3B}"/>
               </a:ext>
             </a:extLst>
           </p:cNvPr>
-          <p:cNvSpPr>
-            <a:spLocks noGrp="1"/>
-          </p:cNvSpPr>
-          <p:nvPr>
-            <p:ph idx="1"/>
-          </p:nvPr>
-        </p:nvSpPr>
-        <p:spPr/>
-        <p:txBody>
-          <a:bodyPr/>
-          <a:lstStyle/>
-          <a:p>
-            <a:endParaRPr lang="en-US"/>
+          <p:cNvPicPr>
+            <a:picLocks noGrp="1" noChangeAspect="1"/>
+          </p:cNvPicPr>
+          <p:nvPr>
+            <p:ph sz="half" idx="2"/>
+          </p:nvPr>
+        </p:nvPicPr>
+        <p:blipFill>
+          <a:blip r:embed="rId2">
+            <a:extLst>
+              <a:ext uri="{28A0092B-C50C-407E-A947-70E740481C1C}">
+                <a14:useLocalDpi xmlns:a14="http://schemas.microsoft.com/office/drawing/2010/main" val="0"/>
+              </a:ext>
+            </a:extLst>
+          </a:blip>
+          <a:stretch>
+            <a:fillRect/>
+          </a:stretch>
+        </p:blipFill>
+        <p:spPr>
+          <a:xfrm>
+            <a:off x="913794" y="1775790"/>
+            <a:ext cx="5023179" cy="4200939"/>
+          </a:xfrm>
+        </p:spPr>
+      </p:pic>
+      <p:pic>
+        <p:nvPicPr>
+          <p:cNvPr id="12" name="Content Placeholder 11" descr="A picture containing person, person, older, work-clothing&#10;&#10;Description automatically generated">
+            <a:extLst>
+              <a:ext uri="{FF2B5EF4-FFF2-40B4-BE49-F238E27FC236}">
+                <a16:creationId xmlns:a16="http://schemas.microsoft.com/office/drawing/2014/main" id="{95810286-D3FE-415E-A958-D16374CBB29B}"/>
+              </a:ext>
+            </a:extLst>
+          </p:cNvPr>
+          <p:cNvPicPr>
+            <a:picLocks noGrp="1" noChangeAspect="1"/>
+          </p:cNvPicPr>
+          <p:nvPr>
+            <p:ph sz="quarter" idx="4"/>
+          </p:nvPr>
+        </p:nvPicPr>
+        <p:blipFill>
+          <a:blip r:embed="rId3">
+            <a:extLst>
+              <a:ext uri="{28A0092B-C50C-407E-A947-70E740481C1C}">
+                <a14:useLocalDpi xmlns:a14="http://schemas.microsoft.com/office/drawing/2010/main" val="0"/>
+              </a:ext>
+            </a:extLst>
+          </a:blip>
+          <a:stretch>
+            <a:fillRect/>
+          </a:stretch>
+        </p:blipFill>
+        <p:spPr>
+          <a:xfrm>
+            <a:off x="6238269" y="1775790"/>
+            <a:ext cx="5023179" cy="4200939"/>
+          </a:xfrm>
+        </p:spPr>
+      </p:pic>
+      <p:sp>
+        <p:nvSpPr>
+          <p:cNvPr id="13" name="TextBox 12">
+            <a:extLst>
+              <a:ext uri="{FF2B5EF4-FFF2-40B4-BE49-F238E27FC236}">
+                <a16:creationId xmlns:a16="http://schemas.microsoft.com/office/drawing/2014/main" id="{6E754AD8-4BCD-4F25-AF10-752772A21190}"/>
+              </a:ext>
+            </a:extLst>
+          </p:cNvPr>
+          <p:cNvSpPr txBox="1"/>
+          <p:nvPr/>
+        </p:nvSpPr>
+        <p:spPr>
+          <a:xfrm>
+            <a:off x="768625" y="6372806"/>
+            <a:ext cx="11317357" cy="307777"/>
+          </a:xfrm>
+          <a:prstGeom prst="rect">
+            <a:avLst/>
+          </a:prstGeom>
+          <a:noFill/>
+        </p:spPr>
+        <p:txBody>
+          <a:bodyPr wrap="square" rtlCol="0">
+            <a:spAutoFit/>
+          </a:bodyPr>
+          <a:lstStyle/>
+          <a:p>
+            <a:r>
+              <a:rPr lang="en-US" sz="1400" dirty="0"/>
+              <a:t>Source: Matteo </a:t>
+            </a:r>
+            <a:r>
+              <a:rPr lang="en-US" sz="1400" dirty="0" err="1"/>
+              <a:t>Ronchettis</a:t>
+            </a:r>
+            <a:r>
+              <a:rPr lang="en-US" sz="1400" dirty="0"/>
+              <a:t> via hackernoon.com/https-medium-com-matteoronchetti-pointillism-with-python-and-opencv-f4274e6bbb7b</a:t>
+            </a:r>
           </a:p>
         </p:txBody>
       </p:sp>

</xml_diff>